<commit_message>
Update midterm presentation materials
</commit_message>
<xml_diff>
--- a/documentation/midterm_presentation/JobSearchEngine_MidtermPresentation.pptx
+++ b/documentation/midterm_presentation/JobSearchEngine_MidtermPresentation.pptx
@@ -8985,7 +8985,7 @@
         <p:spPr>
           <a:xfrm>
             <a:off x="568050" y="1244850"/>
-            <a:ext cx="4807200" cy="2653800"/>
+            <a:ext cx="5312400" cy="2653800"/>
           </a:xfrm>
           <a:prstGeom prst="rect">
             <a:avLst/>
@@ -9573,7 +9573,7 @@
             <a:tbl>
               <a:tblPr>
                 <a:noFill/>
-                <a:tableStyleId>{0D2DF51D-440D-44CD-BBC8-74FBFA9D391A}</a:tableStyleId>
+                <a:tableStyleId>{6CDC5D31-C513-4E7F-8F08-03C6207BC446}</a:tableStyleId>
               </a:tblPr>
               <a:tblGrid>
                 <a:gridCol w="2609000"/>
@@ -11051,7 +11051,74 @@
                   </a:extLst>
                 </a:hlinkClick>
               </a:rPr>
-              <a:t>github.com/msmithp/job-search-engine/documentation/midterm</a:t>
+              <a:t>github.com/msmithp/job-search-engine/tree/main/</a:t>
+            </a:r>
+            <a:endParaRPr>
+              <a:solidFill>
+                <a:schemeClr val="lt1"/>
+              </a:solidFill>
+              <a:latin typeface="Epilogue"/>
+              <a:ea typeface="Epilogue"/>
+              <a:cs typeface="Epilogue"/>
+              <a:sym typeface="Epilogue"/>
+            </a:endParaRPr>
+          </a:p>
+          <a:p>
+            <a:pPr indent="0" lvl="0" marL="0" rtl="0" algn="l">
+              <a:lnSpc>
+                <a:spcPct val="115000"/>
+              </a:lnSpc>
+              <a:spcBef>
+                <a:spcPts val="0"/>
+              </a:spcBef>
+              <a:spcAft>
+                <a:spcPts val="0"/>
+              </a:spcAft>
+              <a:buNone/>
+            </a:pPr>
+            <a:r>
+              <a:rPr lang="en">
+                <a:solidFill>
+                  <a:schemeClr val="lt1"/>
+                </a:solidFill>
+                <a:uFill>
+                  <a:noFill/>
+                </a:uFill>
+                <a:latin typeface="Epilogue"/>
+                <a:ea typeface="Epilogue"/>
+                <a:cs typeface="Epilogue"/>
+                <a:sym typeface="Epilogue"/>
+                <a:hlinkClick r:id="rId4">
+                  <a:extLst>
+                    <a:ext uri="{A12FA001-AC4F-418D-AE19-62706E023703}">
+                      <ahyp:hlinkClr val="tx"/>
+                    </a:ext>
+                  </a:extLst>
+                </a:hlinkClick>
+              </a:rPr>
+              <a:t>documentation/</a:t>
+            </a:r>
+            <a:r>
+              <a:rPr b="1" lang="en">
+                <a:solidFill>
+                  <a:schemeClr val="lt1"/>
+                </a:solidFill>
+                <a:uFill>
+                  <a:noFill/>
+                </a:uFill>
+                <a:latin typeface="Epilogue"/>
+                <a:ea typeface="Epilogue"/>
+                <a:cs typeface="Epilogue"/>
+                <a:sym typeface="Epilogue"/>
+                <a:hlinkClick r:id="rId5">
+                  <a:extLst>
+                    <a:ext uri="{A12FA001-AC4F-418D-AE19-62706E023703}">
+                      <ahyp:hlinkClr val="tx"/>
+                    </a:ext>
+                  </a:extLst>
+                </a:hlinkClick>
+              </a:rPr>
+              <a:t>midterm_presentation</a:t>
             </a:r>
             <a:r>
               <a:rPr lang="en">
@@ -11063,7 +11130,7 @@
                 <a:cs typeface="Epilogue"/>
                 <a:sym typeface="Epilogue"/>
               </a:rPr>
-              <a:t>_presentation.</a:t>
+              <a:t>.</a:t>
             </a:r>
             <a:endParaRPr>
               <a:solidFill>
@@ -13396,7 +13463,7 @@
             <a:tbl>
               <a:tblPr>
                 <a:noFill/>
-                <a:tableStyleId>{0D2DF51D-440D-44CD-BBC8-74FBFA9D391A}</a:tableStyleId>
+                <a:tableStyleId>{6CDC5D31-C513-4E7F-8F08-03C6207BC446}</a:tableStyleId>
               </a:tblPr>
               <a:tblGrid>
                 <a:gridCol w="2609000"/>

</xml_diff>

<commit_message>
Edit midterm presentation, add date
</commit_message>
<xml_diff>
--- a/documentation/midterm_presentation/JobSearchEngine_MidtermPresentation.pptx
+++ b/documentation/midterm_presentation/JobSearchEngine_MidtermPresentation.pptx
@@ -9093,7 +9093,37 @@
               </a:rPr>
               <a:t>MIDTERM PROJECT REPORT</a:t>
             </a:r>
-            <a:endParaRPr sz="2300">
+            <a:endParaRPr sz="2900">
+              <a:latin typeface="Epilogue"/>
+              <a:ea typeface="Epilogue"/>
+              <a:cs typeface="Epilogue"/>
+              <a:sym typeface="Epilogue"/>
+            </a:endParaRPr>
+          </a:p>
+          <a:p>
+            <a:pPr indent="0" lvl="0" marL="0" rtl="0" algn="l">
+              <a:lnSpc>
+                <a:spcPct val="115000"/>
+              </a:lnSpc>
+              <a:spcBef>
+                <a:spcPts val="0"/>
+              </a:spcBef>
+              <a:spcAft>
+                <a:spcPts val="0"/>
+              </a:spcAft>
+              <a:buSzPts val="990"/>
+              <a:buNone/>
+            </a:pPr>
+            <a:r>
+              <a:rPr lang="en" sz="1900">
+                <a:latin typeface="Epilogue"/>
+                <a:ea typeface="Epilogue"/>
+                <a:cs typeface="Epilogue"/>
+                <a:sym typeface="Epilogue"/>
+              </a:rPr>
+              <a:t>March 20, 2025</a:t>
+            </a:r>
+            <a:endParaRPr sz="1900">
               <a:latin typeface="Epilogue"/>
               <a:ea typeface="Epilogue"/>
               <a:cs typeface="Epilogue"/>
@@ -9573,7 +9603,7 @@
             <a:tbl>
               <a:tblPr>
                 <a:noFill/>
-                <a:tableStyleId>{6CDC5D31-C513-4E7F-8F08-03C6207BC446}</a:tableStyleId>
+                <a:tableStyleId>{C1A171E3-5EC7-475A-A5A7-0CB1F6F7A9A7}</a:tableStyleId>
               </a:tblPr>
               <a:tblGrid>
                 <a:gridCol w="2609000"/>
@@ -13463,7 +13493,7 @@
             <a:tbl>
               <a:tblPr>
                 <a:noFill/>
-                <a:tableStyleId>{6CDC5D31-C513-4E7F-8F08-03C6207BC446}</a:tableStyleId>
+                <a:tableStyleId>{C1A171E3-5EC7-475A-A5A7-0CB1F6F7A9A7}</a:tableStyleId>
               </a:tblPr>
               <a:tblGrid>
                 <a:gridCol w="2609000"/>

</xml_diff>